<commit_message>
piccoli dettagli e animazioni
</commit_message>
<xml_diff>
--- a/Siamese Networks and Image Verification.pptx
+++ b/Siamese Networks and Image Verification.pptx
@@ -489,7 +489,7 @@
             <a:fld id="{DC2121CD-E55E-B040-94A4-45A10BF7042E}" type="slidenum">
               <a:rPr lang="it-IT" altLang="it-IT"/>
               <a:pPr/>
-              <a:t>‹N›</a:t>
+              <a:t>‹#›</a:t>
             </a:fld>
             <a:endParaRPr lang="it-IT" altLang="it-IT"/>
           </a:p>
@@ -939,7 +939,7 @@
             <a:fld id="{EF1345C3-B1F9-A84F-A222-E81E7E9EAF08}" type="slidenum">
               <a:rPr lang="it-IT" altLang="it-IT"/>
               <a:pPr/>
-              <a:t>‹N›</a:t>
+              <a:t>‹#›</a:t>
             </a:fld>
             <a:endParaRPr lang="it-IT" altLang="it-IT"/>
           </a:p>
@@ -3501,7 +3501,7 @@
             <a:fld id="{C55A76E4-D6BE-554D-89CA-11081D4A1CDD}" type="slidenum">
               <a:rPr lang="it-IT" altLang="it-IT"/>
               <a:pPr/>
-              <a:t>‹N›</a:t>
+              <a:t>‹#›</a:t>
             </a:fld>
             <a:endParaRPr lang="it-IT" altLang="it-IT"/>
           </a:p>
@@ -3693,7 +3693,7 @@
             <a:fld id="{2C12129C-65FD-B642-A176-B3EBAFDF0BF8}" type="slidenum">
               <a:rPr lang="it-IT" altLang="it-IT"/>
               <a:pPr/>
-              <a:t>‹N›</a:t>
+              <a:t>‹#›</a:t>
             </a:fld>
             <a:endParaRPr lang="it-IT" altLang="it-IT"/>
           </a:p>
@@ -3895,7 +3895,7 @@
             <a:fld id="{E1B24A4E-A9CC-064E-B0CF-B9455740B208}" type="slidenum">
               <a:rPr lang="it-IT" altLang="it-IT"/>
               <a:pPr/>
-              <a:t>‹N›</a:t>
+              <a:t>‹#›</a:t>
             </a:fld>
             <a:endParaRPr lang="it-IT" altLang="it-IT"/>
           </a:p>
@@ -4146,7 +4146,7 @@
             <a:fld id="{9CF514E8-D021-7A48-B9E1-A697529F0D69}" type="slidenum">
               <a:rPr lang="it-IT" altLang="it-IT"/>
               <a:pPr/>
-              <a:t>‹N›</a:t>
+              <a:t>‹#›</a:t>
             </a:fld>
             <a:endParaRPr lang="it-IT" altLang="it-IT"/>
           </a:p>
@@ -4363,7 +4363,7 @@
             <a:fld id="{C80DD478-AD95-0C45-9ACC-2D494CE0F076}" type="slidenum">
               <a:rPr lang="it-IT" altLang="it-IT"/>
               <a:pPr/>
-              <a:t>‹N›</a:t>
+              <a:t>‹#›</a:t>
             </a:fld>
             <a:endParaRPr lang="it-IT" altLang="it-IT"/>
           </a:p>
@@ -4580,7 +4580,7 @@
             <a:fld id="{FC69B914-81C1-894C-9201-64B9B89F632C}" type="slidenum">
               <a:rPr lang="it-IT" altLang="it-IT"/>
               <a:pPr/>
-              <a:t>‹N›</a:t>
+              <a:t>‹#›</a:t>
             </a:fld>
             <a:endParaRPr lang="it-IT" altLang="it-IT"/>
           </a:p>
@@ -4772,7 +4772,7 @@
             <a:fld id="{0CD1DD89-1A4C-6748-9429-7F2332777A4D}" type="slidenum">
               <a:rPr lang="it-IT" altLang="it-IT"/>
               <a:pPr/>
-              <a:t>‹N›</a:t>
+              <a:t>‹#›</a:t>
             </a:fld>
             <a:endParaRPr lang="it-IT" altLang="it-IT"/>
           </a:p>
@@ -5015,7 +5015,7 @@
             <a:fld id="{68D9E2FD-DC87-8D4F-8AEB-57476BEE4632}" type="slidenum">
               <a:rPr lang="it-IT" altLang="it-IT"/>
               <a:pPr/>
-              <a:t>‹N›</a:t>
+              <a:t>‹#›</a:t>
             </a:fld>
             <a:endParaRPr lang="it-IT" altLang="it-IT"/>
           </a:p>
@@ -5246,7 +5246,7 @@
             <a:fld id="{B5A95B49-3A80-C64D-8043-9C5331883486}" type="slidenum">
               <a:rPr lang="it-IT" altLang="it-IT"/>
               <a:pPr/>
-              <a:t>‹N›</a:t>
+              <a:t>‹#›</a:t>
             </a:fld>
             <a:endParaRPr lang="it-IT" altLang="it-IT"/>
           </a:p>
@@ -5624,7 +5624,7 @@
             <a:fld id="{4EA587D9-62EE-9F4A-ADE9-F633C923A371}" type="slidenum">
               <a:rPr lang="it-IT" altLang="it-IT"/>
               <a:pPr/>
-              <a:t>‹N›</a:t>
+              <a:t>‹#›</a:t>
             </a:fld>
             <a:endParaRPr lang="it-IT" altLang="it-IT"/>
           </a:p>
@@ -5787,7 +5787,7 @@
             <a:fld id="{4CB97F5D-5838-A246-B549-FE9DA7615593}" type="slidenum">
               <a:rPr lang="it-IT" altLang="it-IT"/>
               <a:pPr/>
-              <a:t>‹N›</a:t>
+              <a:t>‹#›</a:t>
             </a:fld>
             <a:endParaRPr lang="it-IT" altLang="it-IT"/>
           </a:p>
@@ -5921,7 +5921,7 @@
             <a:fld id="{8FE416E0-39B1-6044-8C56-DD54B777F41D}" type="slidenum">
               <a:rPr lang="it-IT" altLang="it-IT"/>
               <a:pPr/>
-              <a:t>‹N›</a:t>
+              <a:t>‹#›</a:t>
             </a:fld>
             <a:endParaRPr lang="it-IT" altLang="it-IT"/>
           </a:p>
@@ -6226,7 +6226,7 @@
             <a:fld id="{8F803B0B-48B2-2841-8D79-8E62E3EBEE5A}" type="slidenum">
               <a:rPr lang="it-IT" altLang="it-IT"/>
               <a:pPr/>
-              <a:t>‹N›</a:t>
+              <a:t>‹#›</a:t>
             </a:fld>
             <a:endParaRPr lang="it-IT" altLang="it-IT"/>
           </a:p>
@@ -6540,7 +6540,7 @@
             <a:fld id="{C251AD9B-972D-B541-8743-416A464940E5}" type="slidenum">
               <a:rPr lang="it-IT" altLang="it-IT"/>
               <a:pPr/>
-              <a:t>‹N›</a:t>
+              <a:t>‹#›</a:t>
             </a:fld>
             <a:endParaRPr lang="it-IT" altLang="it-IT"/>
           </a:p>
@@ -7064,7 +7064,7 @@
             <a:fld id="{2EA435C3-7509-7446-9E84-9A1C9EC7E3DF}" type="slidenum">
               <a:rPr lang="it-IT" altLang="it-IT"/>
               <a:pPr/>
-              <a:t>‹N›</a:t>
+              <a:t>‹#›</a:t>
             </a:fld>
             <a:endParaRPr lang="it-IT" altLang="it-IT"/>
           </a:p>
@@ -8002,15 +8002,7 @@
             </a:r>
             <a:r>
               <a:rPr lang="en-US" dirty="0"/>
-              <a:t>, </a:t>
-            </a:r>
-            <a:r>
-              <a:rPr lang="en-US" dirty="0" err="1"/>
-              <a:t>aspet</a:t>
-            </a:r>
-            <a:r>
-              <a:rPr lang="en-US" dirty="0"/>
-              <a:t> ratio, </a:t>
+              <a:t>, aspect ratio, </a:t>
             </a:r>
             <a:r>
               <a:rPr lang="en-US" dirty="0" err="1"/>
@@ -24560,6 +24552,79 @@
                                   </p:childTnLst>
                                 </p:cTn>
                               </p:par>
+                              <p:par>
+                                <p:cTn id="9" presetID="2" presetClass="entr" presetSubtype="4" fill="hold" nodeType="withEffect">
+                                  <p:stCondLst>
+                                    <p:cond delay="0"/>
+                                  </p:stCondLst>
+                                  <p:childTnLst>
+                                    <p:set>
+                                      <p:cBhvr>
+                                        <p:cTn id="10" dur="1" fill="hold">
+                                          <p:stCondLst>
+                                            <p:cond delay="0"/>
+                                          </p:stCondLst>
+                                        </p:cTn>
+                                        <p:tgtEl>
+                                          <p:spTgt spid="8"/>
+                                        </p:tgtEl>
+                                        <p:attrNameLst>
+                                          <p:attrName>style.visibility</p:attrName>
+                                        </p:attrNameLst>
+                                      </p:cBhvr>
+                                      <p:to>
+                                        <p:strVal val="visible"/>
+                                      </p:to>
+                                    </p:set>
+                                    <p:anim calcmode="lin" valueType="num">
+                                      <p:cBhvr additive="base">
+                                        <p:cTn id="11" dur="500" fill="hold"/>
+                                        <p:tgtEl>
+                                          <p:spTgt spid="8"/>
+                                        </p:tgtEl>
+                                        <p:attrNameLst>
+                                          <p:attrName>ppt_x</p:attrName>
+                                        </p:attrNameLst>
+                                      </p:cBhvr>
+                                      <p:tavLst>
+                                        <p:tav tm="0">
+                                          <p:val>
+                                            <p:strVal val="#ppt_x"/>
+                                          </p:val>
+                                        </p:tav>
+                                        <p:tav tm="100000">
+                                          <p:val>
+                                            <p:strVal val="#ppt_x"/>
+                                          </p:val>
+                                        </p:tav>
+                                      </p:tavLst>
+                                    </p:anim>
+                                    <p:anim calcmode="lin" valueType="num">
+                                      <p:cBhvr additive="base">
+                                        <p:cTn id="12" dur="500" fill="hold"/>
+                                        <p:tgtEl>
+                                          <p:spTgt spid="8"/>
+                                        </p:tgtEl>
+                                        <p:attrNameLst>
+                                          <p:attrName>ppt_y</p:attrName>
+                                        </p:attrNameLst>
+                                      </p:cBhvr>
+                                      <p:tavLst>
+                                        <p:tav tm="0">
+                                          <p:val>
+                                            <p:strVal val="1+#ppt_h/2"/>
+                                          </p:val>
+                                        </p:tav>
+                                        <p:tav tm="100000">
+                                          <p:val>
+                                            <p:strVal val="#ppt_y"/>
+                                          </p:val>
+                                        </p:tav>
+                                      </p:tavLst>
+                                    </p:anim>
+                                  </p:childTnLst>
+                                </p:cTn>
+                              </p:par>
                             </p:childTnLst>
                           </p:cTn>
                         </p:par>
@@ -24860,6 +24925,9 @@
                     <p:cTn id="3" fill="hold">
                       <p:stCondLst>
                         <p:cond delay="indefinite"/>
+                        <p:cond evt="onBegin" delay="0">
+                          <p:tn val="2"/>
+                        </p:cond>
                       </p:stCondLst>
                       <p:childTnLst>
                         <p:par>
@@ -24869,7 +24937,7 @@
                             </p:stCondLst>
                             <p:childTnLst>
                               <p:par>
-                                <p:cTn id="5" presetID="2" presetClass="entr" presetSubtype="4" fill="hold" grpId="0" nodeType="clickEffect">
+                                <p:cTn id="5" presetID="2" presetClass="entr" presetSubtype="4" fill="hold" nodeType="withEffect">
                                   <p:stCondLst>
                                     <p:cond delay="0"/>
                                   </p:stCondLst>
@@ -24882,11 +24950,7 @@
                                           </p:stCondLst>
                                         </p:cTn>
                                         <p:tgtEl>
-                                          <p:spTgt spid="3">
-                                            <p:txEl>
-                                              <p:pRg st="0" end="0"/>
-                                            </p:txEl>
-                                          </p:spTgt>
+                                          <p:spTgt spid="9"/>
                                         </p:tgtEl>
                                         <p:attrNameLst>
                                           <p:attrName>style.visibility</p:attrName>
@@ -24900,11 +24964,7 @@
                                       <p:cBhvr additive="base">
                                         <p:cTn id="7" dur="500" fill="hold"/>
                                         <p:tgtEl>
-                                          <p:spTgt spid="3">
-                                            <p:txEl>
-                                              <p:pRg st="0" end="0"/>
-                                            </p:txEl>
-                                          </p:spTgt>
+                                          <p:spTgt spid="9"/>
                                         </p:tgtEl>
                                         <p:attrNameLst>
                                           <p:attrName>ppt_x</p:attrName>
@@ -24927,11 +24987,7 @@
                                       <p:cBhvr additive="base">
                                         <p:cTn id="8" dur="500" fill="hold"/>
                                         <p:tgtEl>
-                                          <p:spTgt spid="3">
-                                            <p:txEl>
-                                              <p:pRg st="0" end="0"/>
-                                            </p:txEl>
-                                          </p:spTgt>
+                                          <p:spTgt spid="9"/>
                                         </p:tgtEl>
                                         <p:attrNameLst>
                                           <p:attrName>ppt_y</p:attrName>
@@ -24987,7 +25043,7 @@
                                         <p:tgtEl>
                                           <p:spTgt spid="3">
                                             <p:txEl>
-                                              <p:pRg st="1" end="1"/>
+                                              <p:pRg st="0" end="0"/>
                                             </p:txEl>
                                           </p:spTgt>
                                         </p:tgtEl>
@@ -25005,7 +25061,7 @@
                                         <p:tgtEl>
                                           <p:spTgt spid="3">
                                             <p:txEl>
-                                              <p:pRg st="1" end="1"/>
+                                              <p:pRg st="0" end="0"/>
                                             </p:txEl>
                                           </p:spTgt>
                                         </p:tgtEl>
@@ -25032,7 +25088,7 @@
                                         <p:tgtEl>
                                           <p:spTgt spid="3">
                                             <p:txEl>
-                                              <p:pRg st="1" end="1"/>
+                                              <p:pRg st="0" end="0"/>
                                             </p:txEl>
                                           </p:spTgt>
                                         </p:tgtEl>
@@ -25090,6 +25146,109 @@
                                         <p:tgtEl>
                                           <p:spTgt spid="3">
                                             <p:txEl>
+                                              <p:pRg st="1" end="1"/>
+                                            </p:txEl>
+                                          </p:spTgt>
+                                        </p:tgtEl>
+                                        <p:attrNameLst>
+                                          <p:attrName>style.visibility</p:attrName>
+                                        </p:attrNameLst>
+                                      </p:cBhvr>
+                                      <p:to>
+                                        <p:strVal val="visible"/>
+                                      </p:to>
+                                    </p:set>
+                                    <p:anim calcmode="lin" valueType="num">
+                                      <p:cBhvr additive="base">
+                                        <p:cTn id="19" dur="500" fill="hold"/>
+                                        <p:tgtEl>
+                                          <p:spTgt spid="3">
+                                            <p:txEl>
+                                              <p:pRg st="1" end="1"/>
+                                            </p:txEl>
+                                          </p:spTgt>
+                                        </p:tgtEl>
+                                        <p:attrNameLst>
+                                          <p:attrName>ppt_x</p:attrName>
+                                        </p:attrNameLst>
+                                      </p:cBhvr>
+                                      <p:tavLst>
+                                        <p:tav tm="0">
+                                          <p:val>
+                                            <p:strVal val="#ppt_x"/>
+                                          </p:val>
+                                        </p:tav>
+                                        <p:tav tm="100000">
+                                          <p:val>
+                                            <p:strVal val="#ppt_x"/>
+                                          </p:val>
+                                        </p:tav>
+                                      </p:tavLst>
+                                    </p:anim>
+                                    <p:anim calcmode="lin" valueType="num">
+                                      <p:cBhvr additive="base">
+                                        <p:cTn id="20" dur="500" fill="hold"/>
+                                        <p:tgtEl>
+                                          <p:spTgt spid="3">
+                                            <p:txEl>
+                                              <p:pRg st="1" end="1"/>
+                                            </p:txEl>
+                                          </p:spTgt>
+                                        </p:tgtEl>
+                                        <p:attrNameLst>
+                                          <p:attrName>ppt_y</p:attrName>
+                                        </p:attrNameLst>
+                                      </p:cBhvr>
+                                      <p:tavLst>
+                                        <p:tav tm="0">
+                                          <p:val>
+                                            <p:strVal val="1+#ppt_h/2"/>
+                                          </p:val>
+                                        </p:tav>
+                                        <p:tav tm="100000">
+                                          <p:val>
+                                            <p:strVal val="#ppt_y"/>
+                                          </p:val>
+                                        </p:tav>
+                                      </p:tavLst>
+                                    </p:anim>
+                                  </p:childTnLst>
+                                </p:cTn>
+                              </p:par>
+                            </p:childTnLst>
+                          </p:cTn>
+                        </p:par>
+                      </p:childTnLst>
+                    </p:cTn>
+                  </p:par>
+                  <p:par>
+                    <p:cTn id="21" fill="hold">
+                      <p:stCondLst>
+                        <p:cond delay="indefinite"/>
+                      </p:stCondLst>
+                      <p:childTnLst>
+                        <p:par>
+                          <p:cTn id="22" fill="hold">
+                            <p:stCondLst>
+                              <p:cond delay="0"/>
+                            </p:stCondLst>
+                            <p:childTnLst>
+                              <p:par>
+                                <p:cTn id="23" presetID="2" presetClass="entr" presetSubtype="4" fill="hold" grpId="0" nodeType="clickEffect">
+                                  <p:stCondLst>
+                                    <p:cond delay="0"/>
+                                  </p:stCondLst>
+                                  <p:childTnLst>
+                                    <p:set>
+                                      <p:cBhvr>
+                                        <p:cTn id="24" dur="1" fill="hold">
+                                          <p:stCondLst>
+                                            <p:cond delay="0"/>
+                                          </p:stCondLst>
+                                        </p:cTn>
+                                        <p:tgtEl>
+                                          <p:spTgt spid="3">
+                                            <p:txEl>
                                               <p:pRg st="2" end="2"/>
                                             </p:txEl>
                                           </p:spTgt>
@@ -25104,7 +25263,7 @@
                                     </p:set>
                                     <p:anim calcmode="lin" valueType="num">
                                       <p:cBhvr additive="base">
-                                        <p:cTn id="19" dur="500" fill="hold"/>
+                                        <p:cTn id="25" dur="500" fill="hold"/>
                                         <p:tgtEl>
                                           <p:spTgt spid="3">
                                             <p:txEl>
@@ -25131,7 +25290,7 @@
                                     </p:anim>
                                     <p:anim calcmode="lin" valueType="num">
                                       <p:cBhvr additive="base">
-                                        <p:cTn id="20" dur="500" fill="hold"/>
+                                        <p:cTn id="26" dur="500" fill="hold"/>
                                         <p:tgtEl>
                                           <p:spTgt spid="3">
                                             <p:txEl>

</xml_diff>